<commit_message>
Second UI design & login page UI featurs
</commit_message>
<xml_diff>
--- a/MEDIVICE 혈당관리앱.pptx
+++ b/MEDIVICE 혈당관리앱.pptx
@@ -24,28 +24,28 @@
   <p:notesSz cx="6858000" cy="9144000"/>
   <p:embeddedFontLst>
     <p:embeddedFont>
-      <p:font typeface="TAN Twinkle" panose="020B0600000101010101" charset="0"/>
+      <p:font typeface="Calibri" panose="020F0502020204030204" pitchFamily="34" charset="0"/>
       <p:regular r:id="rId14"/>
+      <p:bold r:id="rId15"/>
+      <p:italic r:id="rId16"/>
+      <p:boldItalic r:id="rId17"/>
     </p:embeddedFont>
     <p:embeddedFont>
-      <p:font typeface="Calibri" panose="020F0502020204030204" pitchFamily="34" charset="0"/>
-      <p:regular r:id="rId15"/>
-      <p:bold r:id="rId16"/>
-      <p:italic r:id="rId17"/>
-      <p:boldItalic r:id="rId18"/>
+      <p:font typeface="TAN Twinkle" panose="020B0600000101010101" charset="0"/>
+      <p:regular r:id="rId18"/>
+    </p:embeddedFont>
+    <p:embeddedFont>
+      <p:font typeface="맑은 고딕" panose="020B0503020000020004" pitchFamily="50" charset="-127"/>
+      <p:regular r:id="rId19"/>
+      <p:bold r:id="rId20"/>
     </p:embeddedFont>
     <p:embeddedFont>
       <p:font typeface="Inter" panose="020B0600000101010101" charset="0"/>
-      <p:regular r:id="rId19"/>
+      <p:regular r:id="rId21"/>
     </p:embeddedFont>
     <p:embeddedFont>
       <p:font typeface="210 빛글" panose="020B0600000101010101" charset="-127"/>
-      <p:regular r:id="rId20"/>
-    </p:embeddedFont>
-    <p:embeddedFont>
-      <p:font typeface="맑은 고딕" panose="020B0503020000020004" pitchFamily="50" charset="-127"/>
-      <p:regular r:id="rId21"/>
-      <p:bold r:id="rId22"/>
+      <p:regular r:id="rId22"/>
     </p:embeddedFont>
   </p:embeddedFontLst>
   <p:defaultTextStyle>
@@ -244,7 +244,7 @@
           <a:p>
             <a:fld id="{72701DEB-256A-4F1F-9B12-58EB279B178A}" type="datetimeFigureOut">
               <a:rPr lang="ko-KR" altLang="en-US" smtClean="0"/>
-              <a:t>2024-11-04</a:t>
+              <a:t>2024-11-05</a:t>
             </a:fld>
             <a:endParaRPr lang="ko-KR" altLang="en-US"/>
           </a:p>
@@ -778,7 +778,7 @@
             <a:fld id="{1D8BD707-D9CF-40AE-B4C6-C98DA3205C09}" type="datetimeFigureOut">
               <a:rPr lang="en-US" smtClean="0"/>
               <a:pPr/>
-              <a:t>11/4/2024</a:t>
+              <a:t>11/5/2024</a:t>
             </a:fld>
             <a:endParaRPr lang="en-US"/>
           </a:p>
@@ -945,7 +945,7 @@
             <a:fld id="{1D8BD707-D9CF-40AE-B4C6-C98DA3205C09}" type="datetimeFigureOut">
               <a:rPr lang="en-US" smtClean="0"/>
               <a:pPr/>
-              <a:t>11/4/2024</a:t>
+              <a:t>11/5/2024</a:t>
             </a:fld>
             <a:endParaRPr lang="en-US"/>
           </a:p>
@@ -1122,7 +1122,7 @@
             <a:fld id="{1D8BD707-D9CF-40AE-B4C6-C98DA3205C09}" type="datetimeFigureOut">
               <a:rPr lang="en-US" smtClean="0"/>
               <a:pPr/>
-              <a:t>11/4/2024</a:t>
+              <a:t>11/5/2024</a:t>
             </a:fld>
             <a:endParaRPr lang="en-US"/>
           </a:p>
@@ -1289,7 +1289,7 @@
             <a:fld id="{1D8BD707-D9CF-40AE-B4C6-C98DA3205C09}" type="datetimeFigureOut">
               <a:rPr lang="en-US" smtClean="0"/>
               <a:pPr/>
-              <a:t>11/4/2024</a:t>
+              <a:t>11/5/2024</a:t>
             </a:fld>
             <a:endParaRPr lang="en-US"/>
           </a:p>
@@ -1532,7 +1532,7 @@
             <a:fld id="{1D8BD707-D9CF-40AE-B4C6-C98DA3205C09}" type="datetimeFigureOut">
               <a:rPr lang="en-US" smtClean="0"/>
               <a:pPr/>
-              <a:t>11/4/2024</a:t>
+              <a:t>11/5/2024</a:t>
             </a:fld>
             <a:endParaRPr lang="en-US"/>
           </a:p>
@@ -1817,7 +1817,7 @@
             <a:fld id="{1D8BD707-D9CF-40AE-B4C6-C98DA3205C09}" type="datetimeFigureOut">
               <a:rPr lang="en-US" smtClean="0"/>
               <a:pPr/>
-              <a:t>11/4/2024</a:t>
+              <a:t>11/5/2024</a:t>
             </a:fld>
             <a:endParaRPr lang="en-US"/>
           </a:p>
@@ -2236,7 +2236,7 @@
             <a:fld id="{1D8BD707-D9CF-40AE-B4C6-C98DA3205C09}" type="datetimeFigureOut">
               <a:rPr lang="en-US" smtClean="0"/>
               <a:pPr/>
-              <a:t>11/4/2024</a:t>
+              <a:t>11/5/2024</a:t>
             </a:fld>
             <a:endParaRPr lang="en-US"/>
           </a:p>
@@ -2351,7 +2351,7 @@
             <a:fld id="{1D8BD707-D9CF-40AE-B4C6-C98DA3205C09}" type="datetimeFigureOut">
               <a:rPr lang="en-US" smtClean="0"/>
               <a:pPr/>
-              <a:t>11/4/2024</a:t>
+              <a:t>11/5/2024</a:t>
             </a:fld>
             <a:endParaRPr lang="en-US"/>
           </a:p>
@@ -2443,7 +2443,7 @@
             <a:fld id="{1D8BD707-D9CF-40AE-B4C6-C98DA3205C09}" type="datetimeFigureOut">
               <a:rPr lang="en-US" smtClean="0"/>
               <a:pPr/>
-              <a:t>11/4/2024</a:t>
+              <a:t>11/5/2024</a:t>
             </a:fld>
             <a:endParaRPr lang="en-US"/>
           </a:p>
@@ -2717,7 +2717,7 @@
             <a:fld id="{1D8BD707-D9CF-40AE-B4C6-C98DA3205C09}" type="datetimeFigureOut">
               <a:rPr lang="en-US" smtClean="0"/>
               <a:pPr/>
-              <a:t>11/4/2024</a:t>
+              <a:t>11/5/2024</a:t>
             </a:fld>
             <a:endParaRPr lang="en-US"/>
           </a:p>
@@ -2967,7 +2967,7 @@
             <a:fld id="{1D8BD707-D9CF-40AE-B4C6-C98DA3205C09}" type="datetimeFigureOut">
               <a:rPr lang="en-US" smtClean="0"/>
               <a:pPr/>
-              <a:t>11/4/2024</a:t>
+              <a:t>11/5/2024</a:t>
             </a:fld>
             <a:endParaRPr lang="en-US"/>
           </a:p>
@@ -3177,7 +3177,7 @@
             <a:fld id="{1D8BD707-D9CF-40AE-B4C6-C98DA3205C09}" type="datetimeFigureOut">
               <a:rPr lang="en-US" smtClean="0"/>
               <a:pPr/>
-              <a:t>11/4/2024</a:t>
+              <a:t>11/5/2024</a:t>
             </a:fld>
             <a:endParaRPr lang="en-US"/>
           </a:p>
@@ -3812,6 +3812,13 @@
   <p:clrMapOvr>
     <a:masterClrMapping/>
   </p:clrMapOvr>
+  <p:timing>
+    <p:tnLst>
+      <p:par>
+        <p:cTn id="1" dur="indefinite" restart="never" nodeType="tmRoot"/>
+      </p:par>
+    </p:tnLst>
+  </p:timing>
 </p:sld>
 </file>
 
@@ -4428,6 +4435,13 @@
   <p:clrMapOvr>
     <a:masterClrMapping/>
   </p:clrMapOvr>
+  <p:timing>
+    <p:tnLst>
+      <p:par>
+        <p:cTn id="1" dur="indefinite" restart="never" nodeType="tmRoot"/>
+      </p:par>
+    </p:tnLst>
+  </p:timing>
 </p:sld>
 </file>
 
@@ -5529,6 +5543,13 @@
   <p:clrMapOvr>
     <a:masterClrMapping/>
   </p:clrMapOvr>
+  <p:timing>
+    <p:tnLst>
+      <p:par>
+        <p:cTn id="1" dur="indefinite" restart="never" nodeType="tmRoot"/>
+      </p:par>
+    </p:tnLst>
+  </p:timing>
 </p:sld>
 </file>
 
@@ -5848,6 +5869,13 @@
   <p:clrMapOvr>
     <a:masterClrMapping/>
   </p:clrMapOvr>
+  <p:timing>
+    <p:tnLst>
+      <p:par>
+        <p:cTn id="1" dur="indefinite" restart="never" nodeType="tmRoot"/>
+      </p:par>
+    </p:tnLst>
+  </p:timing>
 </p:sld>
 </file>
 
@@ -6202,6 +6230,13 @@
   <p:clrMapOvr>
     <a:masterClrMapping/>
   </p:clrMapOvr>
+  <p:timing>
+    <p:tnLst>
+      <p:par>
+        <p:cTn id="1" dur="indefinite" restart="never" nodeType="tmRoot"/>
+      </p:par>
+    </p:tnLst>
+  </p:timing>
 </p:sld>
 </file>
 
@@ -7176,6 +7211,13 @@
   <p:clrMapOvr>
     <a:masterClrMapping/>
   </p:clrMapOvr>
+  <p:timing>
+    <p:tnLst>
+      <p:par>
+        <p:cTn id="1" dur="indefinite" restart="never" nodeType="tmRoot"/>
+      </p:par>
+    </p:tnLst>
+  </p:timing>
 </p:sld>
 </file>
 
@@ -8186,6 +8228,13 @@
   <p:clrMapOvr>
     <a:masterClrMapping/>
   </p:clrMapOvr>
+  <p:timing>
+    <p:tnLst>
+      <p:par>
+        <p:cTn id="1" dur="indefinite" restart="never" nodeType="tmRoot"/>
+      </p:par>
+    </p:tnLst>
+  </p:timing>
 </p:sld>
 </file>
 
@@ -9098,6 +9147,13 @@
   <p:clrMapOvr>
     <a:masterClrMapping/>
   </p:clrMapOvr>
+  <p:timing>
+    <p:tnLst>
+      <p:par>
+        <p:cTn id="1" dur="indefinite" restart="never" nodeType="tmRoot"/>
+      </p:par>
+    </p:tnLst>
+  </p:timing>
 </p:sld>
 </file>
 
@@ -9880,6 +9936,13 @@
   <p:clrMapOvr>
     <a:masterClrMapping/>
   </p:clrMapOvr>
+  <p:timing>
+    <p:tnLst>
+      <p:par>
+        <p:cTn id="1" dur="indefinite" restart="never" nodeType="tmRoot"/>
+      </p:par>
+    </p:tnLst>
+  </p:timing>
 </p:sld>
 </file>
 
@@ -10362,19 +10425,7 @@
                 <a:cs typeface="210 빛글"/>
                 <a:sym typeface="210 빛글"/>
               </a:rPr>
-              <a:t>일일</a:t>
-            </a:r>
-            <a:r>
-              <a:rPr lang="ko-KR" altLang="en-US" sz="2500" dirty="0" smtClean="0">
-                <a:solidFill>
-                  <a:srgbClr val="000000"/>
-                </a:solidFill>
-                <a:latin typeface="210 빛글"/>
-                <a:ea typeface="210 빛글"/>
-                <a:cs typeface="210 빛글"/>
-                <a:sym typeface="210 빛글"/>
-              </a:rPr>
-              <a:t> </a:t>
+              <a:t>일일 </a:t>
             </a:r>
             <a:r>
               <a:rPr lang="en-US" altLang="ko-KR" sz="2500" dirty="0" smtClean="0">
@@ -10462,19 +10513,7 @@
                 <a:cs typeface="210 빛글"/>
                 <a:sym typeface="210 빛글"/>
               </a:rPr>
-              <a:t>  </a:t>
-            </a:r>
-            <a:r>
-              <a:rPr lang="en-US" sz="3399" dirty="0" smtClean="0">
-                <a:solidFill>
-                  <a:srgbClr val="000000"/>
-                </a:solidFill>
-                <a:latin typeface="210 빛글"/>
-                <a:ea typeface="210 빛글"/>
-                <a:cs typeface="210 빛글"/>
-                <a:sym typeface="210 빛글"/>
-              </a:rPr>
-              <a:t>- </a:t>
+              <a:t>  - </a:t>
             </a:r>
             <a:r>
               <a:rPr lang="ko-KR" altLang="en-US" sz="3399" dirty="0" smtClean="0">
@@ -10721,6 +10760,13 @@
   <p:clrMapOvr>
     <a:masterClrMapping/>
   </p:clrMapOvr>
+  <p:timing>
+    <p:tnLst>
+      <p:par>
+        <p:cTn id="1" dur="indefinite" restart="never" nodeType="tmRoot"/>
+      </p:par>
+    </p:tnLst>
+  </p:timing>
 </p:sld>
 </file>
 

</xml_diff>